<commit_message>
Small text changes made to the powerpoints
</commit_message>
<xml_diff>
--- a/Gulf_Coast_R/Rmarkdown_pres/Intro_to_RMarkdown.pptx
+++ b/Gulf_Coast_R/Rmarkdown_pres/Intro_to_RMarkdown.pptx
@@ -255,7 +255,7 @@
           <a:p>
             <a:fld id="{2821751A-BA59-4B7E-969C-D77BEC67ADCA}" type="datetimeFigureOut">
               <a:rPr lang="en-US" smtClean="0"/>
-              <a:t>4/24/2019</a:t>
+              <a:t>4/25/2019</a:t>
             </a:fld>
             <a:endParaRPr lang="en-US"/>
           </a:p>
@@ -425,7 +425,7 @@
           <a:p>
             <a:fld id="{2821751A-BA59-4B7E-969C-D77BEC67ADCA}" type="datetimeFigureOut">
               <a:rPr lang="en-US" smtClean="0"/>
-              <a:t>4/24/2019</a:t>
+              <a:t>4/25/2019</a:t>
             </a:fld>
             <a:endParaRPr lang="en-US"/>
           </a:p>
@@ -605,7 +605,7 @@
           <a:p>
             <a:fld id="{2821751A-BA59-4B7E-969C-D77BEC67ADCA}" type="datetimeFigureOut">
               <a:rPr lang="en-US" smtClean="0"/>
-              <a:t>4/24/2019</a:t>
+              <a:t>4/25/2019</a:t>
             </a:fld>
             <a:endParaRPr lang="en-US"/>
           </a:p>
@@ -775,7 +775,7 @@
           <a:p>
             <a:fld id="{2821751A-BA59-4B7E-969C-D77BEC67ADCA}" type="datetimeFigureOut">
               <a:rPr lang="en-US" smtClean="0"/>
-              <a:t>4/24/2019</a:t>
+              <a:t>4/25/2019</a:t>
             </a:fld>
             <a:endParaRPr lang="en-US"/>
           </a:p>
@@ -1021,7 +1021,7 @@
           <a:p>
             <a:fld id="{2821751A-BA59-4B7E-969C-D77BEC67ADCA}" type="datetimeFigureOut">
               <a:rPr lang="en-US" smtClean="0"/>
-              <a:t>4/24/2019</a:t>
+              <a:t>4/25/2019</a:t>
             </a:fld>
             <a:endParaRPr lang="en-US"/>
           </a:p>
@@ -1253,7 +1253,7 @@
           <a:p>
             <a:fld id="{2821751A-BA59-4B7E-969C-D77BEC67ADCA}" type="datetimeFigureOut">
               <a:rPr lang="en-US" smtClean="0"/>
-              <a:t>4/24/2019</a:t>
+              <a:t>4/25/2019</a:t>
             </a:fld>
             <a:endParaRPr lang="en-US"/>
           </a:p>
@@ -1620,7 +1620,7 @@
           <a:p>
             <a:fld id="{2821751A-BA59-4B7E-969C-D77BEC67ADCA}" type="datetimeFigureOut">
               <a:rPr lang="en-US" smtClean="0"/>
-              <a:t>4/24/2019</a:t>
+              <a:t>4/25/2019</a:t>
             </a:fld>
             <a:endParaRPr lang="en-US"/>
           </a:p>
@@ -1738,7 +1738,7 @@
           <a:p>
             <a:fld id="{2821751A-BA59-4B7E-969C-D77BEC67ADCA}" type="datetimeFigureOut">
               <a:rPr lang="en-US" smtClean="0"/>
-              <a:t>4/24/2019</a:t>
+              <a:t>4/25/2019</a:t>
             </a:fld>
             <a:endParaRPr lang="en-US"/>
           </a:p>
@@ -1833,7 +1833,7 @@
           <a:p>
             <a:fld id="{2821751A-BA59-4B7E-969C-D77BEC67ADCA}" type="datetimeFigureOut">
               <a:rPr lang="en-US" smtClean="0"/>
-              <a:t>4/24/2019</a:t>
+              <a:t>4/25/2019</a:t>
             </a:fld>
             <a:endParaRPr lang="en-US"/>
           </a:p>
@@ -2110,7 +2110,7 @@
           <a:p>
             <a:fld id="{2821751A-BA59-4B7E-969C-D77BEC67ADCA}" type="datetimeFigureOut">
               <a:rPr lang="en-US" smtClean="0"/>
-              <a:t>4/24/2019</a:t>
+              <a:t>4/25/2019</a:t>
             </a:fld>
             <a:endParaRPr lang="en-US"/>
           </a:p>
@@ -2363,7 +2363,7 @@
           <a:p>
             <a:fld id="{2821751A-BA59-4B7E-969C-D77BEC67ADCA}" type="datetimeFigureOut">
               <a:rPr lang="en-US" smtClean="0"/>
-              <a:t>4/24/2019</a:t>
+              <a:t>4/25/2019</a:t>
             </a:fld>
             <a:endParaRPr lang="en-US"/>
           </a:p>
@@ -2576,7 +2576,7 @@
           <a:p>
             <a:fld id="{2821751A-BA59-4B7E-969C-D77BEC67ADCA}" type="datetimeFigureOut">
               <a:rPr lang="en-US" smtClean="0"/>
-              <a:t>4/24/2019</a:t>
+              <a:t>4/25/2019</a:t>
             </a:fld>
             <a:endParaRPr lang="en-US"/>
           </a:p>
@@ -3610,7 +3610,25 @@
               <a:rPr lang="en-US" dirty="0" smtClean="0">
                 <a:latin typeface="Bell MT" panose="02020503060305020303" pitchFamily="18" charset="0"/>
               </a:rPr>
-              <a:t>Format the text with markup language</a:t>
+              <a:t>Format the text </a:t>
+            </a:r>
+            <a:r>
+              <a:rPr lang="en-US" dirty="0" smtClean="0">
+                <a:latin typeface="Bell MT" panose="02020503060305020303" pitchFamily="18" charset="0"/>
+              </a:rPr>
+              <a:t>using</a:t>
+            </a:r>
+            <a:r>
+              <a:rPr lang="en-US" dirty="0" smtClean="0">
+                <a:latin typeface="Bell MT" panose="02020503060305020303" pitchFamily="18" charset="0"/>
+              </a:rPr>
+              <a:t> </a:t>
+            </a:r>
+            <a:r>
+              <a:rPr lang="en-US" dirty="0" smtClean="0">
+                <a:latin typeface="Bell MT" panose="02020503060305020303" pitchFamily="18" charset="0"/>
+              </a:rPr>
+              <a:t>markup language</a:t>
             </a:r>
             <a:endParaRPr lang="en-US" dirty="0">
               <a:latin typeface="Bell MT" panose="02020503060305020303" pitchFamily="18" charset="0"/>
@@ -4097,7 +4115,13 @@
               <a:rPr lang="en-US" dirty="0" smtClean="0">
                 <a:latin typeface="Bell MT" panose="02020503060305020303" pitchFamily="18" charset="0"/>
               </a:rPr>
-              <a:t>Pretty everything else is an extension of that!</a:t>
+              <a:t>Pretty much </a:t>
+            </a:r>
+            <a:r>
+              <a:rPr lang="en-US" dirty="0" smtClean="0">
+                <a:latin typeface="Bell MT" panose="02020503060305020303" pitchFamily="18" charset="0"/>
+              </a:rPr>
+              <a:t>everything else is an extension of that!</a:t>
             </a:r>
           </a:p>
           <a:p>
@@ -4192,17 +4216,8 @@
               <a:rPr lang="en-US" dirty="0" smtClean="0">
                 <a:latin typeface="Bell MT" panose="02020503060305020303" pitchFamily="18" charset="0"/>
               </a:rPr>
-              <a:t>Or ask a friend! (R community &gt; </a:t>
-            </a:r>
-            <a:r>
-              <a:rPr lang="en-US" smtClean="0">
-                <a:latin typeface="Bell MT" panose="02020503060305020303" pitchFamily="18" charset="0"/>
-              </a:rPr>
-              <a:t>general public)</a:t>
-            </a:r>
-            <a:endParaRPr lang="en-US" dirty="0" smtClean="0">
-              <a:latin typeface="Bell MT" panose="02020503060305020303" pitchFamily="18" charset="0"/>
-            </a:endParaRPr>
+              <a:t>Or ask a friend! (R community &gt; general public)</a:t>
+            </a:r>
           </a:p>
           <a:p>
             <a:r>

</xml_diff>